<commit_message>
More illustrations for VC and QC and a skeleton for metagenomics
</commit_message>
<xml_diff>
--- a/materials/lectures/3_Wednesday/Paul.Pyl.VariantCalling.and.QC/Illustrations.pptx
+++ b/materials/lectures/3_Wednesday/Paul.Pyl.VariantCalling.and.QC/Illustrations.pptx
@@ -8,6 +8,7 @@
     <p:sldId id="257" r:id="rId2"/>
     <p:sldId id="258" r:id="rId3"/>
     <p:sldId id="259" r:id="rId4"/>
+    <p:sldId id="260" r:id="rId5"/>
   </p:sldIdLst>
   <p:sldSz cx="9144000" cy="6858000" type="screen4x3"/>
   <p:notesSz cx="6858000" cy="9144000"/>
@@ -11262,6 +11263,450 @@
 </p:sld>
 </file>
 
+<file path=ppt/slides/slide4.xml><?xml version="1.0" encoding="utf-8"?>
+<p:sld xmlns:a="http://schemas.openxmlformats.org/drawingml/2006/main" xmlns:r="http://schemas.openxmlformats.org/officeDocument/2006/relationships" xmlns:p="http://schemas.openxmlformats.org/presentationml/2006/main">
+  <p:cSld>
+    <p:spTree>
+      <p:nvGrpSpPr>
+        <p:cNvPr id="1" name=""/>
+        <p:cNvGrpSpPr/>
+        <p:nvPr/>
+      </p:nvGrpSpPr>
+      <p:grpSpPr>
+        <a:xfrm>
+          <a:off x="0" y="0"/>
+          <a:ext cx="0" cy="0"/>
+          <a:chOff x="0" y="0"/>
+          <a:chExt cx="0" cy="0"/>
+        </a:xfrm>
+      </p:grpSpPr>
+      <p:sp>
+        <p:nvSpPr>
+          <p:cNvPr id="8" name="Rectangle 7"/>
+          <p:cNvSpPr/>
+          <p:nvPr/>
+        </p:nvSpPr>
+        <p:spPr>
+          <a:xfrm>
+            <a:off x="723736" y="805619"/>
+            <a:ext cx="1406507" cy="518873"/>
+          </a:xfrm>
+          <a:prstGeom prst="rect">
+            <a:avLst/>
+          </a:prstGeom>
+        </p:spPr>
+        <p:style>
+          <a:lnRef idx="2">
+            <a:schemeClr val="accent3"/>
+          </a:lnRef>
+          <a:fillRef idx="1">
+            <a:schemeClr val="lt1"/>
+          </a:fillRef>
+          <a:effectRef idx="0">
+            <a:schemeClr val="accent3"/>
+          </a:effectRef>
+          <a:fontRef idx="minor">
+            <a:schemeClr val="dk1"/>
+          </a:fontRef>
+        </p:style>
+        <p:txBody>
+          <a:bodyPr rtlCol="0" anchor="ctr"/>
+          <a:lstStyle/>
+          <a:p>
+            <a:pPr algn="ctr"/>
+            <a:r>
+              <a:rPr lang="en-US" dirty="0" smtClean="0"/>
+              <a:t>Sample</a:t>
+            </a:r>
+            <a:endParaRPr lang="en-US" dirty="0"/>
+          </a:p>
+        </p:txBody>
+      </p:sp>
+      <p:sp>
+        <p:nvSpPr>
+          <p:cNvPr id="9" name="Rectangle 8"/>
+          <p:cNvSpPr/>
+          <p:nvPr/>
+        </p:nvSpPr>
+        <p:spPr>
+          <a:xfrm>
+            <a:off x="977456" y="1665856"/>
+            <a:ext cx="899066" cy="518873"/>
+          </a:xfrm>
+          <a:prstGeom prst="rect">
+            <a:avLst/>
+          </a:prstGeom>
+        </p:spPr>
+        <p:style>
+          <a:lnRef idx="2">
+            <a:schemeClr val="accent3"/>
+          </a:lnRef>
+          <a:fillRef idx="1">
+            <a:schemeClr val="lt1"/>
+          </a:fillRef>
+          <a:effectRef idx="0">
+            <a:schemeClr val="accent3"/>
+          </a:effectRef>
+          <a:fontRef idx="minor">
+            <a:schemeClr val="dk1"/>
+          </a:fontRef>
+        </p:style>
+        <p:txBody>
+          <a:bodyPr rtlCol="0" anchor="ctr"/>
+          <a:lstStyle/>
+          <a:p>
+            <a:pPr algn="ctr"/>
+            <a:r>
+              <a:rPr lang="en-US" dirty="0" smtClean="0"/>
+              <a:t>DNA</a:t>
+            </a:r>
+            <a:endParaRPr lang="en-US" dirty="0"/>
+          </a:p>
+        </p:txBody>
+      </p:sp>
+      <p:sp>
+        <p:nvSpPr>
+          <p:cNvPr id="10" name="Rectangle 9"/>
+          <p:cNvSpPr/>
+          <p:nvPr/>
+        </p:nvSpPr>
+        <p:spPr>
+          <a:xfrm>
+            <a:off x="889791" y="2567055"/>
+            <a:ext cx="1074397" cy="518873"/>
+          </a:xfrm>
+          <a:prstGeom prst="rect">
+            <a:avLst/>
+          </a:prstGeom>
+        </p:spPr>
+        <p:style>
+          <a:lnRef idx="2">
+            <a:schemeClr val="accent3"/>
+          </a:lnRef>
+          <a:fillRef idx="1">
+            <a:schemeClr val="lt1"/>
+          </a:fillRef>
+          <a:effectRef idx="0">
+            <a:schemeClr val="accent3"/>
+          </a:effectRef>
+          <a:fontRef idx="minor">
+            <a:schemeClr val="dk1"/>
+          </a:fontRef>
+        </p:style>
+        <p:txBody>
+          <a:bodyPr rtlCol="0" anchor="ctr"/>
+          <a:lstStyle/>
+          <a:p>
+            <a:pPr algn="ctr"/>
+            <a:r>
+              <a:rPr lang="en-US" dirty="0" smtClean="0"/>
+              <a:t>Reads</a:t>
+            </a:r>
+            <a:endParaRPr lang="en-US" dirty="0"/>
+          </a:p>
+        </p:txBody>
+      </p:sp>
+      <p:sp>
+        <p:nvSpPr>
+          <p:cNvPr id="12" name="Rectangle 11"/>
+          <p:cNvSpPr/>
+          <p:nvPr/>
+        </p:nvSpPr>
+        <p:spPr>
+          <a:xfrm>
+            <a:off x="2368956" y="3085927"/>
+            <a:ext cx="1406507" cy="360000"/>
+          </a:xfrm>
+          <a:prstGeom prst="rect">
+            <a:avLst/>
+          </a:prstGeom>
+        </p:spPr>
+        <p:style>
+          <a:lnRef idx="2">
+            <a:schemeClr val="accent4"/>
+          </a:lnRef>
+          <a:fillRef idx="1">
+            <a:schemeClr val="lt1"/>
+          </a:fillRef>
+          <a:effectRef idx="0">
+            <a:schemeClr val="accent4"/>
+          </a:effectRef>
+          <a:fontRef idx="minor">
+            <a:schemeClr val="dk1"/>
+          </a:fontRef>
+        </p:style>
+        <p:txBody>
+          <a:bodyPr rtlCol="0" anchor="ctr"/>
+          <a:lstStyle/>
+          <a:p>
+            <a:pPr algn="ctr"/>
+            <a:r>
+              <a:rPr lang="en-US" dirty="0" smtClean="0"/>
+              <a:t>Filtering</a:t>
+            </a:r>
+            <a:endParaRPr lang="en-US" dirty="0"/>
+          </a:p>
+        </p:txBody>
+      </p:sp>
+      <p:sp>
+        <p:nvSpPr>
+          <p:cNvPr id="13" name="Rectangle 12"/>
+          <p:cNvSpPr/>
+          <p:nvPr/>
+        </p:nvSpPr>
+        <p:spPr>
+          <a:xfrm>
+            <a:off x="2368956" y="3445927"/>
+            <a:ext cx="1406507" cy="355018"/>
+          </a:xfrm>
+          <a:prstGeom prst="rect">
+            <a:avLst/>
+          </a:prstGeom>
+        </p:spPr>
+        <p:style>
+          <a:lnRef idx="2">
+            <a:schemeClr val="accent4"/>
+          </a:lnRef>
+          <a:fillRef idx="1">
+            <a:schemeClr val="lt1"/>
+          </a:fillRef>
+          <a:effectRef idx="0">
+            <a:schemeClr val="accent4"/>
+          </a:effectRef>
+          <a:fontRef idx="minor">
+            <a:schemeClr val="dk1"/>
+          </a:fontRef>
+        </p:style>
+        <p:txBody>
+          <a:bodyPr rtlCol="0" anchor="ctr"/>
+          <a:lstStyle/>
+          <a:p>
+            <a:pPr algn="ctr"/>
+            <a:r>
+              <a:rPr lang="en-US" dirty="0" smtClean="0"/>
+              <a:t>Mapping</a:t>
+            </a:r>
+            <a:endParaRPr lang="en-US" dirty="0"/>
+          </a:p>
+        </p:txBody>
+      </p:sp>
+      <p:sp>
+        <p:nvSpPr>
+          <p:cNvPr id="14" name="Rectangle 13"/>
+          <p:cNvSpPr/>
+          <p:nvPr/>
+        </p:nvSpPr>
+        <p:spPr>
+          <a:xfrm>
+            <a:off x="2368956" y="3800945"/>
+            <a:ext cx="1406507" cy="360000"/>
+          </a:xfrm>
+          <a:prstGeom prst="rect">
+            <a:avLst/>
+          </a:prstGeom>
+        </p:spPr>
+        <p:style>
+          <a:lnRef idx="2">
+            <a:schemeClr val="accent4"/>
+          </a:lnRef>
+          <a:fillRef idx="1">
+            <a:schemeClr val="lt1"/>
+          </a:fillRef>
+          <a:effectRef idx="0">
+            <a:schemeClr val="accent4"/>
+          </a:effectRef>
+          <a:fontRef idx="minor">
+            <a:schemeClr val="dk1"/>
+          </a:fontRef>
+        </p:style>
+        <p:txBody>
+          <a:bodyPr rtlCol="0" anchor="ctr"/>
+          <a:lstStyle/>
+          <a:p>
+            <a:pPr algn="ctr"/>
+            <a:r>
+              <a:rPr lang="en-US" dirty="0" smtClean="0"/>
+              <a:t>Assembly</a:t>
+            </a:r>
+            <a:endParaRPr lang="en-US" dirty="0"/>
+          </a:p>
+        </p:txBody>
+      </p:sp>
+      <p:sp>
+        <p:nvSpPr>
+          <p:cNvPr id="11" name="Rectangle 10"/>
+          <p:cNvSpPr/>
+          <p:nvPr/>
+        </p:nvSpPr>
+        <p:spPr>
+          <a:xfrm>
+            <a:off x="2368956" y="2567055"/>
+            <a:ext cx="1406507" cy="518873"/>
+          </a:xfrm>
+          <a:prstGeom prst="rect">
+            <a:avLst/>
+          </a:prstGeom>
+        </p:spPr>
+        <p:style>
+          <a:lnRef idx="2">
+            <a:schemeClr val="accent3"/>
+          </a:lnRef>
+          <a:fillRef idx="1">
+            <a:schemeClr val="lt1"/>
+          </a:fillRef>
+          <a:effectRef idx="0">
+            <a:schemeClr val="accent3"/>
+          </a:effectRef>
+          <a:fontRef idx="minor">
+            <a:schemeClr val="dk1"/>
+          </a:fontRef>
+        </p:style>
+        <p:txBody>
+          <a:bodyPr rtlCol="0" anchor="ctr"/>
+          <a:lstStyle/>
+          <a:p>
+            <a:pPr algn="ctr"/>
+            <a:r>
+              <a:rPr lang="en-US" dirty="0" smtClean="0"/>
+              <a:t>Pipeline</a:t>
+            </a:r>
+            <a:endParaRPr lang="en-US" dirty="0"/>
+          </a:p>
+        </p:txBody>
+      </p:sp>
+      <p:cxnSp>
+        <p:nvCxnSpPr>
+          <p:cNvPr id="16" name="Straight Arrow Connector 15"/>
+          <p:cNvCxnSpPr>
+            <a:stCxn id="8" idx="2"/>
+            <a:endCxn id="9" idx="0"/>
+          </p:cNvCxnSpPr>
+          <p:nvPr/>
+        </p:nvCxnSpPr>
+        <p:spPr>
+          <a:xfrm flipH="1">
+            <a:off x="1426989" y="1324492"/>
+            <a:ext cx="1" cy="341364"/>
+          </a:xfrm>
+          <a:prstGeom prst="straightConnector1">
+            <a:avLst/>
+          </a:prstGeom>
+          <a:ln>
+            <a:solidFill>
+              <a:srgbClr val="000000"/>
+            </a:solidFill>
+            <a:tailEnd type="arrow"/>
+          </a:ln>
+          <a:effectLst/>
+        </p:spPr>
+        <p:style>
+          <a:lnRef idx="2">
+            <a:schemeClr val="accent1"/>
+          </a:lnRef>
+          <a:fillRef idx="0">
+            <a:schemeClr val="accent1"/>
+          </a:fillRef>
+          <a:effectRef idx="1">
+            <a:schemeClr val="accent1"/>
+          </a:effectRef>
+          <a:fontRef idx="minor">
+            <a:schemeClr val="tx1"/>
+          </a:fontRef>
+        </p:style>
+      </p:cxnSp>
+      <p:cxnSp>
+        <p:nvCxnSpPr>
+          <p:cNvPr id="18" name="Straight Arrow Connector 17"/>
+          <p:cNvCxnSpPr>
+            <a:stCxn id="9" idx="2"/>
+            <a:endCxn id="10" idx="0"/>
+          </p:cNvCxnSpPr>
+          <p:nvPr/>
+        </p:nvCxnSpPr>
+        <p:spPr>
+          <a:xfrm>
+            <a:off x="1426989" y="2184729"/>
+            <a:ext cx="1" cy="382326"/>
+          </a:xfrm>
+          <a:prstGeom prst="straightConnector1">
+            <a:avLst/>
+          </a:prstGeom>
+          <a:ln>
+            <a:solidFill>
+              <a:srgbClr val="000000"/>
+            </a:solidFill>
+            <a:tailEnd type="arrow"/>
+          </a:ln>
+          <a:effectLst/>
+        </p:spPr>
+        <p:style>
+          <a:lnRef idx="2">
+            <a:schemeClr val="accent1"/>
+          </a:lnRef>
+          <a:fillRef idx="0">
+            <a:schemeClr val="accent1"/>
+          </a:fillRef>
+          <a:effectRef idx="1">
+            <a:schemeClr val="accent1"/>
+          </a:effectRef>
+          <a:fontRef idx="minor">
+            <a:schemeClr val="tx1"/>
+          </a:fontRef>
+        </p:style>
+      </p:cxnSp>
+      <p:cxnSp>
+        <p:nvCxnSpPr>
+          <p:cNvPr id="20" name="Straight Arrow Connector 19"/>
+          <p:cNvCxnSpPr>
+            <a:stCxn id="10" idx="3"/>
+            <a:endCxn id="11" idx="1"/>
+          </p:cNvCxnSpPr>
+          <p:nvPr/>
+        </p:nvCxnSpPr>
+        <p:spPr>
+          <a:xfrm>
+            <a:off x="1964188" y="2826492"/>
+            <a:ext cx="404768" cy="0"/>
+          </a:xfrm>
+          <a:prstGeom prst="straightConnector1">
+            <a:avLst/>
+          </a:prstGeom>
+          <a:ln>
+            <a:solidFill>
+              <a:srgbClr val="000000"/>
+            </a:solidFill>
+            <a:tailEnd type="arrow"/>
+          </a:ln>
+          <a:effectLst/>
+        </p:spPr>
+        <p:style>
+          <a:lnRef idx="2">
+            <a:schemeClr val="accent1"/>
+          </a:lnRef>
+          <a:fillRef idx="0">
+            <a:schemeClr val="accent1"/>
+          </a:fillRef>
+          <a:effectRef idx="1">
+            <a:schemeClr val="accent1"/>
+          </a:effectRef>
+          <a:fontRef idx="minor">
+            <a:schemeClr val="tx1"/>
+          </a:fontRef>
+        </p:style>
+      </p:cxnSp>
+    </p:spTree>
+    <p:extLst>
+      <p:ext uri="{BB962C8B-B14F-4D97-AF65-F5344CB8AC3E}">
+        <p14:creationId xmlns:p14="http://schemas.microsoft.com/office/powerpoint/2010/main" val="481478418"/>
+      </p:ext>
+    </p:extLst>
+  </p:cSld>
+  <p:clrMapOvr>
+    <a:masterClrMapping/>
+  </p:clrMapOvr>
+</p:sld>
+</file>
+
 <file path=ppt/theme/theme1.xml><?xml version="1.0" encoding="utf-8"?>
 <a:theme xmlns:a="http://schemas.openxmlformats.org/drawingml/2006/main" name="Office Theme">
   <a:themeElements>

</xml_diff>